<commit_message>
fix box name in figure
</commit_message>
<xml_diff>
--- a/TTMLWorkflow.pptx
+++ b/TTMLWorkflow.pptx
@@ -4106,12 +4106,16 @@
                 <a:rPr lang="en-US" sz="1400" dirty="0" smtClean="0"/>
                 <a:t>TTML </a:t>
               </a:r>
+              <a:r>
+                <a:rPr lang="en-US" sz="1400" smtClean="0"/>
+                <a:t/>
+              </a:r>
               <a:br>
-                <a:rPr lang="en-US" sz="1400" dirty="0" smtClean="0"/>
+                <a:rPr lang="en-US" sz="1400" smtClean="0"/>
               </a:br>
               <a:r>
-                <a:rPr lang="en-US" sz="1400" dirty="0" smtClean="0"/>
-                <a:t>Authoring Tool</a:t>
+                <a:rPr lang="en-US" sz="1400" smtClean="0"/>
+                <a:t>Post-Processor</a:t>
               </a:r>
               <a:endParaRPr lang="en-US" sz="1400" dirty="0"/>
             </a:p>

</xml_diff>

<commit_message>
rename "TTML pre-processor" to "TTML Segmenter" #4 https://github.com/rbouqueau/TTML_in_MP4_DASH_statement/issues/4#issuecomment-160963216
</commit_message>
<xml_diff>
--- a/TTMLWorkflow.pptx
+++ b/TTMLWorkflow.pptx
@@ -288,7 +288,8 @@
           <a:p>
             <a:fld id="{F96A1EAD-CFF2-4E76-975B-B5C2A4CA1E2C}" type="datetimeFigureOut">
               <a:rPr lang="en-US" smtClean="0"/>
-              <a:t>11/23/2015</a:t>
+              <a:pPr/>
+              <a:t>1/14/2016</a:t>
             </a:fld>
             <a:endParaRPr lang="en-US"/>
           </a:p>
@@ -330,7 +331,8 @@
           <a:p>
             <a:fld id="{57419675-1AC2-4F34-AFB9-5577044D5224}" type="slidenum">
               <a:rPr lang="en-US" smtClean="0"/>
-              <a:t>‹N°›</a:t>
+              <a:pPr/>
+              <a:t>‹#›</a:t>
             </a:fld>
             <a:endParaRPr lang="en-US"/>
           </a:p>
@@ -339,7 +341,7 @@
     </p:spTree>
     <p:extLst>
       <p:ext uri="{BB962C8B-B14F-4D97-AF65-F5344CB8AC3E}">
-        <p14:creationId xmlns:p14="http://schemas.microsoft.com/office/powerpoint/2010/main" val="3151904945"/>
+        <p14:creationId xmlns:p14="http://schemas.microsoft.com/office/powerpoint/2010/main" xmlns="" val="3151904945"/>
       </p:ext>
     </p:extLst>
   </p:cSld>
@@ -458,7 +460,8 @@
           <a:p>
             <a:fld id="{F96A1EAD-CFF2-4E76-975B-B5C2A4CA1E2C}" type="datetimeFigureOut">
               <a:rPr lang="en-US" smtClean="0"/>
-              <a:t>11/23/2015</a:t>
+              <a:pPr/>
+              <a:t>1/14/2016</a:t>
             </a:fld>
             <a:endParaRPr lang="en-US"/>
           </a:p>
@@ -500,7 +503,8 @@
           <a:p>
             <a:fld id="{57419675-1AC2-4F34-AFB9-5577044D5224}" type="slidenum">
               <a:rPr lang="en-US" smtClean="0"/>
-              <a:t>‹N°›</a:t>
+              <a:pPr/>
+              <a:t>‹#›</a:t>
             </a:fld>
             <a:endParaRPr lang="en-US"/>
           </a:p>
@@ -509,7 +513,7 @@
     </p:spTree>
     <p:extLst>
       <p:ext uri="{BB962C8B-B14F-4D97-AF65-F5344CB8AC3E}">
-        <p14:creationId xmlns:p14="http://schemas.microsoft.com/office/powerpoint/2010/main" val="2926270341"/>
+        <p14:creationId xmlns:p14="http://schemas.microsoft.com/office/powerpoint/2010/main" xmlns="" val="2926270341"/>
       </p:ext>
     </p:extLst>
   </p:cSld>
@@ -638,7 +642,8 @@
           <a:p>
             <a:fld id="{F96A1EAD-CFF2-4E76-975B-B5C2A4CA1E2C}" type="datetimeFigureOut">
               <a:rPr lang="en-US" smtClean="0"/>
-              <a:t>11/23/2015</a:t>
+              <a:pPr/>
+              <a:t>1/14/2016</a:t>
             </a:fld>
             <a:endParaRPr lang="en-US"/>
           </a:p>
@@ -680,7 +685,8 @@
           <a:p>
             <a:fld id="{57419675-1AC2-4F34-AFB9-5577044D5224}" type="slidenum">
               <a:rPr lang="en-US" smtClean="0"/>
-              <a:t>‹N°›</a:t>
+              <a:pPr/>
+              <a:t>‹#›</a:t>
             </a:fld>
             <a:endParaRPr lang="en-US"/>
           </a:p>
@@ -689,7 +695,7 @@
     </p:spTree>
     <p:extLst>
       <p:ext uri="{BB962C8B-B14F-4D97-AF65-F5344CB8AC3E}">
-        <p14:creationId xmlns:p14="http://schemas.microsoft.com/office/powerpoint/2010/main" val="1579984290"/>
+        <p14:creationId xmlns:p14="http://schemas.microsoft.com/office/powerpoint/2010/main" xmlns="" val="1579984290"/>
       </p:ext>
     </p:extLst>
   </p:cSld>
@@ -808,7 +814,8 @@
           <a:p>
             <a:fld id="{F96A1EAD-CFF2-4E76-975B-B5C2A4CA1E2C}" type="datetimeFigureOut">
               <a:rPr lang="en-US" smtClean="0"/>
-              <a:t>11/23/2015</a:t>
+              <a:pPr/>
+              <a:t>1/14/2016</a:t>
             </a:fld>
             <a:endParaRPr lang="en-US"/>
           </a:p>
@@ -850,7 +857,8 @@
           <a:p>
             <a:fld id="{57419675-1AC2-4F34-AFB9-5577044D5224}" type="slidenum">
               <a:rPr lang="en-US" smtClean="0"/>
-              <a:t>‹N°›</a:t>
+              <a:pPr/>
+              <a:t>‹#›</a:t>
             </a:fld>
             <a:endParaRPr lang="en-US"/>
           </a:p>
@@ -859,7 +867,7 @@
     </p:spTree>
     <p:extLst>
       <p:ext uri="{BB962C8B-B14F-4D97-AF65-F5344CB8AC3E}">
-        <p14:creationId xmlns:p14="http://schemas.microsoft.com/office/powerpoint/2010/main" val="3072711723"/>
+        <p14:creationId xmlns:p14="http://schemas.microsoft.com/office/powerpoint/2010/main" xmlns="" val="3072711723"/>
       </p:ext>
     </p:extLst>
   </p:cSld>
@@ -1054,7 +1062,8 @@
           <a:p>
             <a:fld id="{F96A1EAD-CFF2-4E76-975B-B5C2A4CA1E2C}" type="datetimeFigureOut">
               <a:rPr lang="en-US" smtClean="0"/>
-              <a:t>11/23/2015</a:t>
+              <a:pPr/>
+              <a:t>1/14/2016</a:t>
             </a:fld>
             <a:endParaRPr lang="en-US"/>
           </a:p>
@@ -1096,7 +1105,8 @@
           <a:p>
             <a:fld id="{57419675-1AC2-4F34-AFB9-5577044D5224}" type="slidenum">
               <a:rPr lang="en-US" smtClean="0"/>
-              <a:t>‹N°›</a:t>
+              <a:pPr/>
+              <a:t>‹#›</a:t>
             </a:fld>
             <a:endParaRPr lang="en-US"/>
           </a:p>
@@ -1105,7 +1115,7 @@
     </p:spTree>
     <p:extLst>
       <p:ext uri="{BB962C8B-B14F-4D97-AF65-F5344CB8AC3E}">
-        <p14:creationId xmlns:p14="http://schemas.microsoft.com/office/powerpoint/2010/main" val="2413344506"/>
+        <p14:creationId xmlns:p14="http://schemas.microsoft.com/office/powerpoint/2010/main" xmlns="" val="2413344506"/>
       </p:ext>
     </p:extLst>
   </p:cSld>
@@ -1342,7 +1352,8 @@
           <a:p>
             <a:fld id="{F96A1EAD-CFF2-4E76-975B-B5C2A4CA1E2C}" type="datetimeFigureOut">
               <a:rPr lang="en-US" smtClean="0"/>
-              <a:t>11/23/2015</a:t>
+              <a:pPr/>
+              <a:t>1/14/2016</a:t>
             </a:fld>
             <a:endParaRPr lang="en-US"/>
           </a:p>
@@ -1384,7 +1395,8 @@
           <a:p>
             <a:fld id="{57419675-1AC2-4F34-AFB9-5577044D5224}" type="slidenum">
               <a:rPr lang="en-US" smtClean="0"/>
-              <a:t>‹N°›</a:t>
+              <a:pPr/>
+              <a:t>‹#›</a:t>
             </a:fld>
             <a:endParaRPr lang="en-US"/>
           </a:p>
@@ -1393,7 +1405,7 @@
     </p:spTree>
     <p:extLst>
       <p:ext uri="{BB962C8B-B14F-4D97-AF65-F5344CB8AC3E}">
-        <p14:creationId xmlns:p14="http://schemas.microsoft.com/office/powerpoint/2010/main" val="2022321022"/>
+        <p14:creationId xmlns:p14="http://schemas.microsoft.com/office/powerpoint/2010/main" xmlns="" val="2022321022"/>
       </p:ext>
     </p:extLst>
   </p:cSld>
@@ -1764,7 +1776,8 @@
           <a:p>
             <a:fld id="{F96A1EAD-CFF2-4E76-975B-B5C2A4CA1E2C}" type="datetimeFigureOut">
               <a:rPr lang="en-US" smtClean="0"/>
-              <a:t>11/23/2015</a:t>
+              <a:pPr/>
+              <a:t>1/14/2016</a:t>
             </a:fld>
             <a:endParaRPr lang="en-US"/>
           </a:p>
@@ -1806,7 +1819,8 @@
           <a:p>
             <a:fld id="{57419675-1AC2-4F34-AFB9-5577044D5224}" type="slidenum">
               <a:rPr lang="en-US" smtClean="0"/>
-              <a:t>‹N°›</a:t>
+              <a:pPr/>
+              <a:t>‹#›</a:t>
             </a:fld>
             <a:endParaRPr lang="en-US"/>
           </a:p>
@@ -1815,7 +1829,7 @@
     </p:spTree>
     <p:extLst>
       <p:ext uri="{BB962C8B-B14F-4D97-AF65-F5344CB8AC3E}">
-        <p14:creationId xmlns:p14="http://schemas.microsoft.com/office/powerpoint/2010/main" val="3199534570"/>
+        <p14:creationId xmlns:p14="http://schemas.microsoft.com/office/powerpoint/2010/main" xmlns="" val="3199534570"/>
       </p:ext>
     </p:extLst>
   </p:cSld>
@@ -1882,7 +1896,8 @@
           <a:p>
             <a:fld id="{F96A1EAD-CFF2-4E76-975B-B5C2A4CA1E2C}" type="datetimeFigureOut">
               <a:rPr lang="en-US" smtClean="0"/>
-              <a:t>11/23/2015</a:t>
+              <a:pPr/>
+              <a:t>1/14/2016</a:t>
             </a:fld>
             <a:endParaRPr lang="en-US"/>
           </a:p>
@@ -1924,7 +1939,8 @@
           <a:p>
             <a:fld id="{57419675-1AC2-4F34-AFB9-5577044D5224}" type="slidenum">
               <a:rPr lang="en-US" smtClean="0"/>
-              <a:t>‹N°›</a:t>
+              <a:pPr/>
+              <a:t>‹#›</a:t>
             </a:fld>
             <a:endParaRPr lang="en-US"/>
           </a:p>
@@ -1933,7 +1949,7 @@
     </p:spTree>
     <p:extLst>
       <p:ext uri="{BB962C8B-B14F-4D97-AF65-F5344CB8AC3E}">
-        <p14:creationId xmlns:p14="http://schemas.microsoft.com/office/powerpoint/2010/main" val="2746287785"/>
+        <p14:creationId xmlns:p14="http://schemas.microsoft.com/office/powerpoint/2010/main" xmlns="" val="2746287785"/>
       </p:ext>
     </p:extLst>
   </p:cSld>
@@ -1977,7 +1993,8 @@
           <a:p>
             <a:fld id="{F96A1EAD-CFF2-4E76-975B-B5C2A4CA1E2C}" type="datetimeFigureOut">
               <a:rPr lang="en-US" smtClean="0"/>
-              <a:t>11/23/2015</a:t>
+              <a:pPr/>
+              <a:t>1/14/2016</a:t>
             </a:fld>
             <a:endParaRPr lang="en-US"/>
           </a:p>
@@ -2019,7 +2036,8 @@
           <a:p>
             <a:fld id="{57419675-1AC2-4F34-AFB9-5577044D5224}" type="slidenum">
               <a:rPr lang="en-US" smtClean="0"/>
-              <a:t>‹N°›</a:t>
+              <a:pPr/>
+              <a:t>‹#›</a:t>
             </a:fld>
             <a:endParaRPr lang="en-US"/>
           </a:p>
@@ -2028,7 +2046,7 @@
     </p:spTree>
     <p:extLst>
       <p:ext uri="{BB962C8B-B14F-4D97-AF65-F5344CB8AC3E}">
-        <p14:creationId xmlns:p14="http://schemas.microsoft.com/office/powerpoint/2010/main" val="1708799810"/>
+        <p14:creationId xmlns:p14="http://schemas.microsoft.com/office/powerpoint/2010/main" xmlns="" val="1708799810"/>
       </p:ext>
     </p:extLst>
   </p:cSld>
@@ -2254,7 +2272,8 @@
           <a:p>
             <a:fld id="{F96A1EAD-CFF2-4E76-975B-B5C2A4CA1E2C}" type="datetimeFigureOut">
               <a:rPr lang="en-US" smtClean="0"/>
-              <a:t>11/23/2015</a:t>
+              <a:pPr/>
+              <a:t>1/14/2016</a:t>
             </a:fld>
             <a:endParaRPr lang="en-US"/>
           </a:p>
@@ -2296,7 +2315,8 @@
           <a:p>
             <a:fld id="{57419675-1AC2-4F34-AFB9-5577044D5224}" type="slidenum">
               <a:rPr lang="en-US" smtClean="0"/>
-              <a:t>‹N°›</a:t>
+              <a:pPr/>
+              <a:t>‹#›</a:t>
             </a:fld>
             <a:endParaRPr lang="en-US"/>
           </a:p>
@@ -2305,7 +2325,7 @@
     </p:spTree>
     <p:extLst>
       <p:ext uri="{BB962C8B-B14F-4D97-AF65-F5344CB8AC3E}">
-        <p14:creationId xmlns:p14="http://schemas.microsoft.com/office/powerpoint/2010/main" val="838323054"/>
+        <p14:creationId xmlns:p14="http://schemas.microsoft.com/office/powerpoint/2010/main" xmlns="" val="838323054"/>
       </p:ext>
     </p:extLst>
   </p:cSld>
@@ -2507,7 +2527,8 @@
           <a:p>
             <a:fld id="{F96A1EAD-CFF2-4E76-975B-B5C2A4CA1E2C}" type="datetimeFigureOut">
               <a:rPr lang="en-US" smtClean="0"/>
-              <a:t>11/23/2015</a:t>
+              <a:pPr/>
+              <a:t>1/14/2016</a:t>
             </a:fld>
             <a:endParaRPr lang="en-US"/>
           </a:p>
@@ -2549,7 +2570,8 @@
           <a:p>
             <a:fld id="{57419675-1AC2-4F34-AFB9-5577044D5224}" type="slidenum">
               <a:rPr lang="en-US" smtClean="0"/>
-              <a:t>‹N°›</a:t>
+              <a:pPr/>
+              <a:t>‹#›</a:t>
             </a:fld>
             <a:endParaRPr lang="en-US"/>
           </a:p>
@@ -2558,7 +2580,7 @@
     </p:spTree>
     <p:extLst>
       <p:ext uri="{BB962C8B-B14F-4D97-AF65-F5344CB8AC3E}">
-        <p14:creationId xmlns:p14="http://schemas.microsoft.com/office/powerpoint/2010/main" val="3434264195"/>
+        <p14:creationId xmlns:p14="http://schemas.microsoft.com/office/powerpoint/2010/main" xmlns="" val="3434264195"/>
       </p:ext>
     </p:extLst>
   </p:cSld>
@@ -2720,7 +2742,8 @@
           <a:p>
             <a:fld id="{F96A1EAD-CFF2-4E76-975B-B5C2A4CA1E2C}" type="datetimeFigureOut">
               <a:rPr lang="en-US" smtClean="0"/>
-              <a:t>11/23/2015</a:t>
+              <a:pPr/>
+              <a:t>1/14/2016</a:t>
             </a:fld>
             <a:endParaRPr lang="en-US"/>
           </a:p>
@@ -2798,7 +2821,8 @@
           <a:p>
             <a:fld id="{57419675-1AC2-4F34-AFB9-5577044D5224}" type="slidenum">
               <a:rPr lang="en-US" smtClean="0"/>
-              <a:t>‹N°›</a:t>
+              <a:pPr/>
+              <a:t>‹#›</a:t>
             </a:fld>
             <a:endParaRPr lang="en-US"/>
           </a:p>
@@ -2807,7 +2831,7 @@
     </p:spTree>
     <p:extLst>
       <p:ext uri="{BB962C8B-B14F-4D97-AF65-F5344CB8AC3E}">
-        <p14:creationId xmlns:p14="http://schemas.microsoft.com/office/powerpoint/2010/main" val="3530991526"/>
+        <p14:creationId xmlns:p14="http://schemas.microsoft.com/office/powerpoint/2010/main" xmlns="" val="3530991526"/>
       </p:ext>
     </p:extLst>
   </p:cSld>
@@ -4106,16 +4130,12 @@
                 <a:rPr lang="en-US" sz="1400" dirty="0" smtClean="0"/>
                 <a:t>TTML </a:t>
               </a:r>
-              <a:r>
-                <a:rPr lang="en-US" sz="1400" smtClean="0"/>
-                <a:t/>
-              </a:r>
               <a:br>
-                <a:rPr lang="en-US" sz="1400" smtClean="0"/>
+                <a:rPr lang="en-US" sz="1400" dirty="0" smtClean="0"/>
               </a:br>
               <a:r>
-                <a:rPr lang="en-US" sz="1400" smtClean="0"/>
-                <a:t>Post-Processor</a:t>
+                <a:rPr lang="en-US" sz="1400" dirty="0" err="1" smtClean="0"/>
+                <a:t>Segmenter</a:t>
               </a:r>
               <a:endParaRPr lang="en-US" sz="1400" dirty="0"/>
             </a:p>
@@ -4162,7 +4182,7 @@
     </p:spTree>
     <p:extLst>
       <p:ext uri="{BB962C8B-B14F-4D97-AF65-F5344CB8AC3E}">
-        <p14:creationId xmlns:p14="http://schemas.microsoft.com/office/powerpoint/2010/main" val="4193859658"/>
+        <p14:creationId xmlns:p14="http://schemas.microsoft.com/office/powerpoint/2010/main" xmlns="" val="4193859658"/>
       </p:ext>
     </p:extLst>
   </p:cSld>

</xml_diff>